<commit_message>
Update materials for 2023
</commit_message>
<xml_diff>
--- a/slides/01_meta-analytic-thinking.pptx
+++ b/slides/01_meta-analytic-thinking.pptx
@@ -3594,7 +3594,7 @@
           <a:p>
             <a:fld id="{A5B9E9DD-BE87-46D0-98E6-18D835742F3D}" type="datetimeFigureOut">
               <a:rPr lang="en-US" smtClean="0"/>
-              <a:t>3/9/2022</a:t>
+              <a:t>3/5/23</a:t>
             </a:fld>
             <a:endParaRPr lang="en-US"/>
           </a:p>
@@ -7636,7 +7636,7 @@
         <p:spPr/>
         <p:txBody>
           <a:bodyPr>
-            <a:normAutofit fontScale="92500" lnSpcReduction="10000"/>
+            <a:normAutofit/>
           </a:bodyPr>
           <a:lstStyle/>
           <a:p>
@@ -9582,7 +9582,7 @@
         <p:spPr/>
         <p:txBody>
           <a:bodyPr>
-            <a:normAutofit fontScale="92500" lnSpcReduction="20000"/>
+            <a:normAutofit fontScale="92500"/>
           </a:bodyPr>
           <a:lstStyle/>
           <a:p>
@@ -11836,7 +11836,7 @@
         <p:spPr/>
         <p:txBody>
           <a:bodyPr>
-            <a:normAutofit fontScale="92500"/>
+            <a:normAutofit lnSpcReduction="10000"/>
           </a:bodyPr>
           <a:lstStyle/>
           <a:p>
@@ -12339,8 +12339,8 @@
           </a:p>
         </p:txBody>
       </p:sp>
-      <mc:AlternateContent xmlns:mc="http://schemas.openxmlformats.org/markup-compatibility/2006" xmlns:a14="http://schemas.microsoft.com/office/drawing/2010/main">
-        <mc:Choice Requires="a14">
+      <mc:AlternateContent xmlns:mc="http://schemas.openxmlformats.org/markup-compatibility/2006">
+        <mc:Choice xmlns:a14="http://schemas.microsoft.com/office/drawing/2010/main" Requires="a14">
           <p:sp>
             <p:nvSpPr>
               <p:cNvPr id="3" name="Content Placeholder 2"/>
@@ -12354,7 +12354,7 @@
             <p:spPr/>
             <p:txBody>
               <a:bodyPr>
-                <a:normAutofit lnSpcReduction="10000"/>
+                <a:normAutofit/>
               </a:bodyPr>
               <a:lstStyle/>
               <a:p>
@@ -12582,7 +12582,7 @@
             </p:txBody>
           </p:sp>
         </mc:Choice>
-        <mc:Fallback xmlns="">
+        <mc:Fallback>
           <p:sp>
             <p:nvSpPr>
               <p:cNvPr id="3" name="Content Placeholder 2"/>
@@ -12597,7 +12597,7 @@
               <a:blipFill>
                 <a:blip r:embed="rId2"/>
                 <a:stretch>
-                  <a:fillRect l="-1086" t="-2410"/>
+                  <a:fillRect l="-1086" t="-1506"/>
                 </a:stretch>
               </a:blipFill>
             </p:spPr>
@@ -15740,7 +15740,7 @@
         </p:spPr>
         <p:txBody>
           <a:bodyPr>
-            <a:normAutofit fontScale="92500"/>
+            <a:normAutofit/>
           </a:bodyPr>
           <a:lstStyle/>
           <a:p>
@@ -15894,7 +15894,7 @@
         <p:spPr/>
         <p:txBody>
           <a:bodyPr>
-            <a:normAutofit fontScale="92500" lnSpcReduction="20000"/>
+            <a:normAutofit fontScale="92500"/>
           </a:bodyPr>
           <a:lstStyle/>
           <a:p>
@@ -16279,7 +16279,7 @@
         <p:spPr/>
         <p:txBody>
           <a:bodyPr>
-            <a:normAutofit fontScale="90000"/>
+            <a:normAutofit/>
           </a:bodyPr>
           <a:lstStyle/>
           <a:p>
@@ -16309,7 +16309,7 @@
         <p:spPr/>
         <p:txBody>
           <a:bodyPr>
-            <a:normAutofit fontScale="92500" lnSpcReduction="10000"/>
+            <a:normAutofit/>
           </a:bodyPr>
           <a:lstStyle/>
           <a:p>
@@ -17396,8 +17396,8 @@
           </a:p>
         </p:txBody>
       </p:sp>
-      <mc:AlternateContent xmlns:mc="http://schemas.openxmlformats.org/markup-compatibility/2006" xmlns:a14="http://schemas.microsoft.com/office/drawing/2010/main">
-        <mc:Choice Requires="a14">
+      <mc:AlternateContent xmlns:mc="http://schemas.openxmlformats.org/markup-compatibility/2006">
+        <mc:Choice xmlns:a14="http://schemas.microsoft.com/office/drawing/2010/main" Requires="a14">
           <p:sp>
             <p:nvSpPr>
               <p:cNvPr id="3" name="Content Placeholder 2">
@@ -17422,7 +17422,7 @@
             </p:spPr>
             <p:txBody>
               <a:bodyPr>
-                <a:normAutofit lnSpcReduction="10000"/>
+                <a:normAutofit/>
               </a:bodyPr>
               <a:lstStyle/>
               <a:p>
@@ -18179,7 +18179,7 @@
             </p:txBody>
           </p:sp>
         </mc:Choice>
-        <mc:Fallback xmlns="">
+        <mc:Fallback>
           <p:sp>
             <p:nvSpPr>
               <p:cNvPr id="3" name="Content Placeholder 2">
@@ -18204,7 +18204,7 @@
               <a:blipFill>
                 <a:blip r:embed="rId2"/>
                 <a:stretch>
-                  <a:fillRect l="-1043"/>
+                  <a:fillRect l="-1086" t="-17414" b="-1319"/>
                 </a:stretch>
               </a:blipFill>
             </p:spPr>
@@ -18662,12 +18662,14 @@
             <a:spLocks noGrp="1"/>
           </p:cNvSpPr>
           <p:nvPr>
-            <p:ph idx="1"/>
+            <p:ph sz="half" idx="1"/>
           </p:nvPr>
         </p:nvSpPr>
         <p:spPr/>
         <p:txBody>
-          <a:bodyPr/>
+          <a:bodyPr>
+            <a:normAutofit fontScale="92500" lnSpcReduction="20000"/>
+          </a:bodyPr>
           <a:lstStyle/>
           <a:p>
             <a:pPr marL="0" indent="0">
@@ -18675,7 +18677,7 @@
             </a:pPr>
             <a:r>
               <a:rPr lang="en-US" dirty="0"/>
-              <a:t>Log OR ratios can be interpreted using a </a:t>
+              <a:t>Log OR can be interpreted using a </a:t>
             </a:r>
             <a:r>
               <a:rPr lang="en-US" b="1" dirty="0"/>
@@ -18689,34 +18691,229 @@
             <a:endParaRPr lang="en-US" dirty="0"/>
           </a:p>
           <a:p>
+            <a:pPr marL="0" indent="0">
+              <a:buNone/>
+            </a:pPr>
+            <a:r>
+              <a:rPr lang="en-US" dirty="0"/>
+              <a:t>Log odds: </a:t>
+            </a:r>
+          </a:p>
+          <a:p>
+            <a:pPr lvl="1"/>
             <a:r>
               <a:rPr lang="en-US" dirty="0"/>
               <a:t>0 = even, 50% probability</a:t>
             </a:r>
           </a:p>
           <a:p>
+            <a:pPr lvl="1"/>
             <a:r>
               <a:rPr lang="en-US" dirty="0"/>
               <a:t>1 = 75% probability</a:t>
             </a:r>
           </a:p>
           <a:p>
+            <a:pPr lvl="1"/>
             <a:r>
               <a:rPr lang="en-US" dirty="0"/>
               <a:t>2 = 88% probability</a:t>
             </a:r>
           </a:p>
           <a:p>
+            <a:pPr lvl="1"/>
             <a:r>
               <a:rPr lang="en-US" dirty="0"/>
               <a:t>3 = 95% probability</a:t>
             </a:r>
           </a:p>
           <a:p>
+            <a:pPr lvl="1"/>
             <a:r>
               <a:rPr lang="en-US" dirty="0"/>
               <a:t>4 = always, 98% probability</a:t>
             </a:r>
+          </a:p>
+        </p:txBody>
+      </p:sp>
+      <p:sp>
+        <p:nvSpPr>
+          <p:cNvPr id="4" name="Content Placeholder 3">
+            <a:extLst>
+              <a:ext uri="{FF2B5EF4-FFF2-40B4-BE49-F238E27FC236}">
+                <a16:creationId xmlns:a16="http://schemas.microsoft.com/office/drawing/2014/main" id="{E5D381C3-BF70-DEB6-4C0B-98F3F4EB3CA5}"/>
+              </a:ext>
+            </a:extLst>
+          </p:cNvPr>
+          <p:cNvSpPr>
+            <a:spLocks noGrp="1"/>
+          </p:cNvSpPr>
+          <p:nvPr>
+            <p:ph sz="half" idx="2"/>
+          </p:nvPr>
+        </p:nvSpPr>
+        <p:spPr/>
+        <p:txBody>
+          <a:bodyPr>
+            <a:normAutofit fontScale="92500" lnSpcReduction="20000"/>
+          </a:bodyPr>
+          <a:lstStyle/>
+          <a:p>
+            <a:pPr marL="0" indent="0">
+              <a:buNone/>
+            </a:pPr>
+            <a:r>
+              <a:rPr lang="en-US" dirty="0"/>
+              <a:t>Comparison with Cohen’s </a:t>
+            </a:r>
+            <a:r>
+              <a:rPr lang="en-US" i="1" dirty="0"/>
+              <a:t>d</a:t>
+            </a:r>
+            <a:endParaRPr lang="en-US" dirty="0"/>
+          </a:p>
+          <a:p>
+            <a:pPr lvl="1"/>
+            <a:r>
+              <a:rPr lang="en-US" dirty="0"/>
+              <a:t>See </a:t>
+            </a:r>
+            <a:r>
+              <a:rPr lang="en-US" b="0" i="0" u="sng" dirty="0">
+                <a:effectLst/>
+                <a:latin typeface="Trebuchet MS" panose="020B0703020202090204" pitchFamily="34" charset="0"/>
+                <a:hlinkClick r:id="rId2"/>
+              </a:rPr>
+              <a:t>https://doi.org/cxshr5</a:t>
+            </a:r>
+            <a:endParaRPr lang="en-US" b="0" i="0" u="sng" dirty="0">
+              <a:effectLst/>
+              <a:latin typeface="Trebuchet MS" panose="020B0703020202090204" pitchFamily="34" charset="0"/>
+            </a:endParaRPr>
+          </a:p>
+          <a:p>
+            <a:pPr lvl="1"/>
+            <a:endParaRPr lang="en-US" dirty="0"/>
+          </a:p>
+          <a:p>
+            <a:r>
+              <a:rPr lang="en-US" dirty="0"/>
+              <a:t>When base rate is 1%, </a:t>
+            </a:r>
+            <a:br>
+              <a:rPr lang="en-US" dirty="0"/>
+            </a:br>
+            <a:r>
+              <a:rPr lang="en-US" dirty="0"/>
+              <a:t>OR (log OR): </a:t>
+            </a:r>
+          </a:p>
+          <a:p>
+            <a:pPr lvl="1"/>
+            <a:r>
+              <a:rPr lang="en-US" dirty="0"/>
+              <a:t>&lt; 1.7 (.53) ∼ </a:t>
+            </a:r>
+            <a:r>
+              <a:rPr lang="en-US" i="1" dirty="0"/>
+              <a:t>d</a:t>
+            </a:r>
+            <a:r>
+              <a:rPr lang="en-US" dirty="0"/>
+              <a:t> ≲ .20 (“negligible”)</a:t>
+            </a:r>
+          </a:p>
+          <a:p>
+            <a:pPr lvl="1"/>
+            <a:r>
+              <a:rPr lang="en-US" dirty="0"/>
+              <a:t>= 1.7 (.53) ∼ </a:t>
+            </a:r>
+            <a:r>
+              <a:rPr lang="en-US" i="1" dirty="0"/>
+              <a:t>d</a:t>
+            </a:r>
+            <a:r>
+              <a:rPr lang="en-US" dirty="0"/>
+              <a:t> ≈ .20 (“small”)</a:t>
+            </a:r>
+          </a:p>
+          <a:p>
+            <a:pPr lvl="1"/>
+            <a:r>
+              <a:rPr lang="en-US" dirty="0"/>
+              <a:t>= 2.8 (1.0) ∼ </a:t>
+            </a:r>
+            <a:r>
+              <a:rPr lang="en-US" i="1" dirty="0"/>
+              <a:t>d</a:t>
+            </a:r>
+            <a:r>
+              <a:rPr lang="en-US" dirty="0"/>
+              <a:t> ≈ .40 (“medium”)</a:t>
+            </a:r>
+          </a:p>
+          <a:p>
+            <a:pPr lvl="1"/>
+            <a:r>
+              <a:rPr lang="en-US" dirty="0"/>
+              <a:t>= 4.4 (1.5) ∼ </a:t>
+            </a:r>
+            <a:r>
+              <a:rPr lang="en-US" i="1" dirty="0"/>
+              <a:t>d</a:t>
+            </a:r>
+            <a:r>
+              <a:rPr lang="en-US" dirty="0"/>
+              <a:t> ≈ .60 (“large”)</a:t>
+            </a:r>
+          </a:p>
+          <a:p>
+            <a:pPr lvl="1"/>
+            <a:r>
+              <a:rPr lang="en-US" dirty="0"/>
+              <a:t>= 6.7 (1.9) ∼ </a:t>
+            </a:r>
+            <a:r>
+              <a:rPr lang="en-US" i="1" dirty="0"/>
+              <a:t>d</a:t>
+            </a:r>
+            <a:r>
+              <a:rPr lang="en-US" dirty="0"/>
+              <a:t> ≈ .80 (“very large”)</a:t>
+            </a:r>
+          </a:p>
+          <a:p>
+            <a:pPr lvl="1"/>
+            <a:endParaRPr lang="en-US" dirty="0"/>
+          </a:p>
+          <a:p>
+            <a:r>
+              <a:rPr lang="en-US" dirty="0"/>
+              <a:t>Simple rules of thumb: </a:t>
+            </a:r>
+          </a:p>
+          <a:p>
+            <a:pPr lvl="1"/>
+            <a:r>
+              <a:rPr lang="en-US" dirty="0"/>
+              <a:t>OR &lt; 1.5 (small)</a:t>
+            </a:r>
+          </a:p>
+          <a:p>
+            <a:pPr lvl="1"/>
+            <a:r>
+              <a:rPr lang="en-US" dirty="0"/>
+              <a:t>OR &gt; 5 (large)</a:t>
+            </a:r>
+          </a:p>
+          <a:p>
+            <a:pPr lvl="1"/>
+            <a:endParaRPr lang="en-US" dirty="0"/>
+          </a:p>
+          <a:p>
+            <a:pPr lvl="1"/>
+            <a:endParaRPr lang="en-US" dirty="0"/>
           </a:p>
         </p:txBody>
       </p:sp>
@@ -23123,7 +23320,7 @@
         <p:spPr/>
         <p:txBody>
           <a:bodyPr>
-            <a:normAutofit fontScale="90000"/>
+            <a:normAutofit/>
           </a:bodyPr>
           <a:lstStyle/>
           <a:p>
@@ -23847,7 +24044,7 @@
         <p:spPr/>
         <p:txBody>
           <a:bodyPr>
-            <a:normAutofit fontScale="90000"/>
+            <a:normAutofit/>
           </a:bodyPr>
           <a:lstStyle/>
           <a:p>
@@ -24692,7 +24889,7 @@
         </p:spPr>
         <p:txBody>
           <a:bodyPr>
-            <a:normAutofit fontScale="92500"/>
+            <a:normAutofit/>
           </a:bodyPr>
           <a:lstStyle/>
           <a:p>
@@ -25491,7 +25688,7 @@
         <p:spPr/>
         <p:txBody>
           <a:bodyPr>
-            <a:normAutofit fontScale="90000"/>
+            <a:normAutofit/>
           </a:bodyPr>
           <a:lstStyle/>
           <a:p>
@@ -26733,6 +26930,15 @@
 </file>
 
 <file path=customXml/item1.xml><?xml version="1.0" encoding="utf-8"?>
+<?mso-contentType ?>
+<FormTemplates xmlns="http://schemas.microsoft.com/sharepoint/v3/contenttype/forms">
+  <Display>DocumentLibraryForm</Display>
+  <Edit>DocumentLibraryForm</Edit>
+  <New>DocumentLibraryForm</New>
+</FormTemplates>
+</file>
+
+<file path=customXml/item2.xml><?xml version="1.0" encoding="utf-8"?>
 <ct:contentTypeSchema xmlns:ct="http://schemas.microsoft.com/office/2006/metadata/contentType" xmlns:ma="http://schemas.microsoft.com/office/2006/metadata/properties/metaAttributes" ct:_="" ma:_="" ma:contentTypeName="Document" ma:contentTypeID="0x010100C510C8780454A64385BF21049B1850C5" ma:contentTypeVersion="7" ma:contentTypeDescription="Create a new document." ma:contentTypeScope="" ma:versionID="47a68a81adc4e0e7972bb95a1a99f0b4">
   <xsd:schema xmlns:xsd="http://www.w3.org/2001/XMLSchema" xmlns:xs="http://www.w3.org/2001/XMLSchema" xmlns:p="http://schemas.microsoft.com/office/2006/metadata/properties" xmlns:ns2="d0331357-42e6-4e40-bf0a-1c2f9464db1b" targetNamespace="http://schemas.microsoft.com/office/2006/metadata/properties" ma:root="true" ma:fieldsID="01ec8d09ee7b5b75bd0cb813fd513e00" ns2:_="">
     <xsd:import namespace="d0331357-42e6-4e40-bf0a-1c2f9464db1b"/>
@@ -26896,22 +27102,21 @@
 </ct:contentTypeSchema>
 </file>
 
-<file path=customXml/item2.xml><?xml version="1.0" encoding="utf-8"?>
+<file path=customXml/item3.xml><?xml version="1.0" encoding="utf-8"?>
 <p:properties xmlns:p="http://schemas.microsoft.com/office/2006/metadata/properties" xmlns:xsi="http://www.w3.org/2001/XMLSchema-instance" xmlns:pc="http://schemas.microsoft.com/office/infopath/2007/PartnerControls">
   <documentManagement/>
 </p:properties>
 </file>
 
-<file path=customXml/item3.xml><?xml version="1.0" encoding="utf-8"?>
-<?mso-contentType ?>
-<FormTemplates xmlns="http://schemas.microsoft.com/sharepoint/v3/contenttype/forms">
-  <Display>DocumentLibraryForm</Display>
-  <Edit>DocumentLibraryForm</Edit>
-  <New>DocumentLibraryForm</New>
-</FormTemplates>
+<file path=customXml/itemProps1.xml><?xml version="1.0" encoding="utf-8"?>
+<ds:datastoreItem xmlns:ds="http://schemas.openxmlformats.org/officeDocument/2006/customXml" ds:itemID="{65F011C9-6572-4E3B-BA4C-E687532965A9}">
+  <ds:schemaRefs>
+    <ds:schemaRef ds:uri="http://schemas.microsoft.com/sharepoint/v3/contenttype/forms"/>
+  </ds:schemaRefs>
+</ds:datastoreItem>
 </file>
 
-<file path=customXml/itemProps1.xml><?xml version="1.0" encoding="utf-8"?>
+<file path=customXml/itemProps2.xml><?xml version="1.0" encoding="utf-8"?>
 <ds:datastoreItem xmlns:ds="http://schemas.openxmlformats.org/officeDocument/2006/customXml" ds:itemID="{8E01F417-FF7B-490D-BC83-D2E21BA12BB0}">
   <ds:schemaRefs>
     <ds:schemaRef ds:uri="d0331357-42e6-4e40-bf0a-1c2f9464db1b"/>
@@ -26929,7 +27134,7 @@
 </ds:datastoreItem>
 </file>
 
-<file path=customXml/itemProps2.xml><?xml version="1.0" encoding="utf-8"?>
+<file path=customXml/itemProps3.xml><?xml version="1.0" encoding="utf-8"?>
 <ds:datastoreItem xmlns:ds="http://schemas.openxmlformats.org/officeDocument/2006/customXml" ds:itemID="{11197415-BC9D-4352-8615-FFE6194E5163}">
   <ds:schemaRefs>
     <ds:schemaRef ds:uri="http://purl.org/dc/dcmitype/"/>
@@ -26942,12 +27147,4 @@
     <ds:schemaRef ds:uri="http://www.w3.org/XML/1998/namespace"/>
   </ds:schemaRefs>
 </ds:datastoreItem>
-</file>
-
-<file path=customXml/itemProps3.xml><?xml version="1.0" encoding="utf-8"?>
-<ds:datastoreItem xmlns:ds="http://schemas.openxmlformats.org/officeDocument/2006/customXml" ds:itemID="{65F011C9-6572-4E3B-BA4C-E687532965A9}">
-  <ds:schemaRefs>
-    <ds:schemaRef ds:uri="http://schemas.microsoft.com/sharepoint/v3/contenttype/forms"/>
-  </ds:schemaRefs>
-</ds:datastoreItem>
 </file>
</xml_diff>